<commit_message>
Description of Data: Done Updated Goals and Tasks Updated Process Book Added titles to presentation but no content yet
</commit_message>
<xml_diff>
--- a/02_Initial_Project_Plan/06 Presentation.pptx
+++ b/02_Initial_Project_Plan/06 Presentation.pptx
@@ -6,6 +6,10 @@
   </p:sldMasterIdLst>
   <p:sldIdLst>
     <p:sldId id="256" r:id="rId2"/>
+    <p:sldId id="257" r:id="rId3"/>
+    <p:sldId id="258" r:id="rId4"/>
+    <p:sldId id="259" r:id="rId5"/>
+    <p:sldId id="260" r:id="rId6"/>
   </p:sldIdLst>
   <p:sldSz cx="12192000" cy="6858000"/>
   <p:notesSz cx="6858000" cy="9144000"/>
@@ -238,7 +242,7 @@
           <a:p>
             <a:fld id="{3C71AE24-98F8-0D47-B4DF-D6AA1ACEABFA}" type="datetimeFigureOut">
               <a:rPr lang="en-US" smtClean="0"/>
-              <a:t>3/26/16</a:t>
+              <a:t>3/27/2016</a:t>
             </a:fld>
             <a:endParaRPr lang="en-US"/>
           </a:p>
@@ -280,7 +284,7 @@
           <a:p>
             <a:fld id="{6E87BB9F-5CF4-D648-AB75-8E3C0B1E4890}" type="slidenum">
               <a:rPr lang="en-US" smtClean="0"/>
-              <a:t>‹#›</a:t>
+              <a:t>‹N°›</a:t>
             </a:fld>
             <a:endParaRPr lang="en-US"/>
           </a:p>
@@ -408,7 +412,7 @@
           <a:p>
             <a:fld id="{3C71AE24-98F8-0D47-B4DF-D6AA1ACEABFA}" type="datetimeFigureOut">
               <a:rPr lang="en-US" smtClean="0"/>
-              <a:t>3/26/16</a:t>
+              <a:t>3/27/2016</a:t>
             </a:fld>
             <a:endParaRPr lang="en-US"/>
           </a:p>
@@ -450,7 +454,7 @@
           <a:p>
             <a:fld id="{6E87BB9F-5CF4-D648-AB75-8E3C0B1E4890}" type="slidenum">
               <a:rPr lang="en-US" smtClean="0"/>
-              <a:t>‹#›</a:t>
+              <a:t>‹N°›</a:t>
             </a:fld>
             <a:endParaRPr lang="en-US"/>
           </a:p>
@@ -588,7 +592,7 @@
           <a:p>
             <a:fld id="{3C71AE24-98F8-0D47-B4DF-D6AA1ACEABFA}" type="datetimeFigureOut">
               <a:rPr lang="en-US" smtClean="0"/>
-              <a:t>3/26/16</a:t>
+              <a:t>3/27/2016</a:t>
             </a:fld>
             <a:endParaRPr lang="en-US"/>
           </a:p>
@@ -630,7 +634,7 @@
           <a:p>
             <a:fld id="{6E87BB9F-5CF4-D648-AB75-8E3C0B1E4890}" type="slidenum">
               <a:rPr lang="en-US" smtClean="0"/>
-              <a:t>‹#›</a:t>
+              <a:t>‹N°›</a:t>
             </a:fld>
             <a:endParaRPr lang="en-US"/>
           </a:p>
@@ -758,7 +762,7 @@
           <a:p>
             <a:fld id="{3C71AE24-98F8-0D47-B4DF-D6AA1ACEABFA}" type="datetimeFigureOut">
               <a:rPr lang="en-US" smtClean="0"/>
-              <a:t>3/26/16</a:t>
+              <a:t>3/27/2016</a:t>
             </a:fld>
             <a:endParaRPr lang="en-US"/>
           </a:p>
@@ -800,7 +804,7 @@
           <a:p>
             <a:fld id="{6E87BB9F-5CF4-D648-AB75-8E3C0B1E4890}" type="slidenum">
               <a:rPr lang="en-US" smtClean="0"/>
-              <a:t>‹#›</a:t>
+              <a:t>‹N°›</a:t>
             </a:fld>
             <a:endParaRPr lang="en-US"/>
           </a:p>
@@ -1004,7 +1008,7 @@
           <a:p>
             <a:fld id="{3C71AE24-98F8-0D47-B4DF-D6AA1ACEABFA}" type="datetimeFigureOut">
               <a:rPr lang="en-US" smtClean="0"/>
-              <a:t>3/26/16</a:t>
+              <a:t>3/27/2016</a:t>
             </a:fld>
             <a:endParaRPr lang="en-US"/>
           </a:p>
@@ -1046,7 +1050,7 @@
           <a:p>
             <a:fld id="{6E87BB9F-5CF4-D648-AB75-8E3C0B1E4890}" type="slidenum">
               <a:rPr lang="en-US" smtClean="0"/>
-              <a:t>‹#›</a:t>
+              <a:t>‹N°›</a:t>
             </a:fld>
             <a:endParaRPr lang="en-US"/>
           </a:p>
@@ -1236,7 +1240,7 @@
           <a:p>
             <a:fld id="{3C71AE24-98F8-0D47-B4DF-D6AA1ACEABFA}" type="datetimeFigureOut">
               <a:rPr lang="en-US" smtClean="0"/>
-              <a:t>3/26/16</a:t>
+              <a:t>3/27/2016</a:t>
             </a:fld>
             <a:endParaRPr lang="en-US"/>
           </a:p>
@@ -1278,7 +1282,7 @@
           <a:p>
             <a:fld id="{6E87BB9F-5CF4-D648-AB75-8E3C0B1E4890}" type="slidenum">
               <a:rPr lang="en-US" smtClean="0"/>
-              <a:t>‹#›</a:t>
+              <a:t>‹N°›</a:t>
             </a:fld>
             <a:endParaRPr lang="en-US"/>
           </a:p>
@@ -1603,7 +1607,7 @@
           <a:p>
             <a:fld id="{3C71AE24-98F8-0D47-B4DF-D6AA1ACEABFA}" type="datetimeFigureOut">
               <a:rPr lang="en-US" smtClean="0"/>
-              <a:t>3/26/16</a:t>
+              <a:t>3/27/2016</a:t>
             </a:fld>
             <a:endParaRPr lang="en-US"/>
           </a:p>
@@ -1645,7 +1649,7 @@
           <a:p>
             <a:fld id="{6E87BB9F-5CF4-D648-AB75-8E3C0B1E4890}" type="slidenum">
               <a:rPr lang="en-US" smtClean="0"/>
-              <a:t>‹#›</a:t>
+              <a:t>‹N°›</a:t>
             </a:fld>
             <a:endParaRPr lang="en-US"/>
           </a:p>
@@ -1721,7 +1725,7 @@
           <a:p>
             <a:fld id="{3C71AE24-98F8-0D47-B4DF-D6AA1ACEABFA}" type="datetimeFigureOut">
               <a:rPr lang="en-US" smtClean="0"/>
-              <a:t>3/26/16</a:t>
+              <a:t>3/27/2016</a:t>
             </a:fld>
             <a:endParaRPr lang="en-US"/>
           </a:p>
@@ -1763,7 +1767,7 @@
           <a:p>
             <a:fld id="{6E87BB9F-5CF4-D648-AB75-8E3C0B1E4890}" type="slidenum">
               <a:rPr lang="en-US" smtClean="0"/>
-              <a:t>‹#›</a:t>
+              <a:t>‹N°›</a:t>
             </a:fld>
             <a:endParaRPr lang="en-US"/>
           </a:p>
@@ -1816,7 +1820,7 @@
           <a:p>
             <a:fld id="{3C71AE24-98F8-0D47-B4DF-D6AA1ACEABFA}" type="datetimeFigureOut">
               <a:rPr lang="en-US" smtClean="0"/>
-              <a:t>3/26/16</a:t>
+              <a:t>3/27/2016</a:t>
             </a:fld>
             <a:endParaRPr lang="en-US"/>
           </a:p>
@@ -1858,7 +1862,7 @@
           <a:p>
             <a:fld id="{6E87BB9F-5CF4-D648-AB75-8E3C0B1E4890}" type="slidenum">
               <a:rPr lang="en-US" smtClean="0"/>
-              <a:t>‹#›</a:t>
+              <a:t>‹N°›</a:t>
             </a:fld>
             <a:endParaRPr lang="en-US"/>
           </a:p>
@@ -2093,7 +2097,7 @@
           <a:p>
             <a:fld id="{3C71AE24-98F8-0D47-B4DF-D6AA1ACEABFA}" type="datetimeFigureOut">
               <a:rPr lang="en-US" smtClean="0"/>
-              <a:t>3/26/16</a:t>
+              <a:t>3/27/2016</a:t>
             </a:fld>
             <a:endParaRPr lang="en-US"/>
           </a:p>
@@ -2135,7 +2139,7 @@
           <a:p>
             <a:fld id="{6E87BB9F-5CF4-D648-AB75-8E3C0B1E4890}" type="slidenum">
               <a:rPr lang="en-US" smtClean="0"/>
-              <a:t>‹#›</a:t>
+              <a:t>‹N°›</a:t>
             </a:fld>
             <a:endParaRPr lang="en-US"/>
           </a:p>
@@ -2346,7 +2350,7 @@
           <a:p>
             <a:fld id="{3C71AE24-98F8-0D47-B4DF-D6AA1ACEABFA}" type="datetimeFigureOut">
               <a:rPr lang="en-US" smtClean="0"/>
-              <a:t>3/26/16</a:t>
+              <a:t>3/27/2016</a:t>
             </a:fld>
             <a:endParaRPr lang="en-US"/>
           </a:p>
@@ -2388,7 +2392,7 @@
           <a:p>
             <a:fld id="{6E87BB9F-5CF4-D648-AB75-8E3C0B1E4890}" type="slidenum">
               <a:rPr lang="en-US" smtClean="0"/>
-              <a:t>‹#›</a:t>
+              <a:t>‹N°›</a:t>
             </a:fld>
             <a:endParaRPr lang="en-US"/>
           </a:p>
@@ -2559,7 +2563,7 @@
           <a:p>
             <a:fld id="{3C71AE24-98F8-0D47-B4DF-D6AA1ACEABFA}" type="datetimeFigureOut">
               <a:rPr lang="en-US" smtClean="0"/>
-              <a:t>3/26/16</a:t>
+              <a:t>3/27/2016</a:t>
             </a:fld>
             <a:endParaRPr lang="en-US"/>
           </a:p>
@@ -2637,7 +2641,7 @@
           <a:p>
             <a:fld id="{6E87BB9F-5CF4-D648-AB75-8E3C0B1E4890}" type="slidenum">
               <a:rPr lang="en-US" smtClean="0"/>
-              <a:t>‹#›</a:t>
+              <a:t>‹N°›</a:t>
             </a:fld>
             <a:endParaRPr lang="en-US"/>
           </a:p>
@@ -2981,17 +2985,13 @@
           <a:p>
             <a:r>
               <a:rPr lang="en-US" dirty="0" smtClean="0"/>
-              <a:t>The </a:t>
-            </a:r>
-            <a:r>
-              <a:rPr lang="en-US" dirty="0" err="1" smtClean="0"/>
-              <a:t>Nato</a:t>
-            </a:r>
-            <a:r>
-              <a:rPr lang="en-US" smtClean="0"/>
-              <a:t> Project</a:t>
-            </a:r>
-            <a:endParaRPr lang="en-US"/>
+              <a:t>Ukraine C-IED </a:t>
+            </a:r>
+            <a:r>
+              <a:rPr lang="en-US" dirty="0" smtClean="0"/>
+              <a:t>Project</a:t>
+            </a:r>
+            <a:endParaRPr lang="en-US" dirty="0"/>
           </a:p>
         </p:txBody>
       </p:sp>
@@ -3005,12 +3005,136 @@
             <p:ph type="subTitle" idx="1"/>
           </p:nvPr>
         </p:nvSpPr>
-        <p:spPr/>
-        <p:txBody>
-          <a:bodyPr/>
-          <a:lstStyle/>
-          <a:p>
-            <a:endParaRPr lang="en-US"/>
+        <p:spPr>
+          <a:xfrm>
+            <a:off x="1524000" y="3602038"/>
+            <a:ext cx="9144000" cy="1984946"/>
+          </a:xfrm>
+        </p:spPr>
+        <p:txBody>
+          <a:bodyPr>
+            <a:normAutofit fontScale="25000" lnSpcReduction="20000"/>
+          </a:bodyPr>
+          <a:lstStyle/>
+          <a:p>
+            <a:pPr>
+              <a:lnSpc>
+                <a:spcPct val="120000"/>
+              </a:lnSpc>
+              <a:spcBef>
+                <a:spcPts val="0"/>
+              </a:spcBef>
+              <a:spcAft>
+                <a:spcPts val="600"/>
+              </a:spcAft>
+            </a:pPr>
+            <a:r>
+              <a:rPr lang="en-CA" sz="9600" b="1" dirty="0"/>
+              <a:t>Online Studio 3 Group 3</a:t>
+            </a:r>
+            <a:endParaRPr lang="fr-CA" sz="9600" b="1" dirty="0"/>
+          </a:p>
+          <a:p>
+            <a:pPr>
+              <a:lnSpc>
+                <a:spcPct val="120000"/>
+              </a:lnSpc>
+              <a:spcBef>
+                <a:spcPts val="0"/>
+              </a:spcBef>
+            </a:pPr>
+            <a:r>
+              <a:rPr lang="fr-CA" sz="9600" dirty="0" smtClean="0"/>
+              <a:t>Valérie Lavigne, </a:t>
+            </a:r>
+            <a:r>
+              <a:rPr lang="fr-CA" sz="9600" u="sng" dirty="0" smtClean="0">
+                <a:hlinkClick r:id="rId2"/>
+              </a:rPr>
+              <a:t>valelavi@gmail.com</a:t>
+            </a:r>
+            <a:endParaRPr lang="fr-CA" sz="9600" dirty="0"/>
+          </a:p>
+          <a:p>
+            <a:pPr>
+              <a:lnSpc>
+                <a:spcPct val="120000"/>
+              </a:lnSpc>
+              <a:spcBef>
+                <a:spcPts val="0"/>
+              </a:spcBef>
+            </a:pPr>
+            <a:r>
+              <a:rPr lang="fr-CA" sz="9600" dirty="0" smtClean="0"/>
+              <a:t>Marius </a:t>
+            </a:r>
+            <a:r>
+              <a:rPr lang="fr-CA" sz="9600" dirty="0" err="1" smtClean="0"/>
+              <a:t>Panga</a:t>
+            </a:r>
+            <a:r>
+              <a:rPr lang="fr-CA" sz="9600" dirty="0" smtClean="0"/>
+              <a:t>, </a:t>
+            </a:r>
+            <a:r>
+              <a:rPr lang="en-CA" sz="9600" u="sng" dirty="0" smtClean="0">
+                <a:hlinkClick r:id="rId3"/>
+              </a:rPr>
+              <a:t>marius.c.panga@gmail.com</a:t>
+            </a:r>
+            <a:endParaRPr lang="fr-CA" sz="9600" dirty="0"/>
+          </a:p>
+          <a:p>
+            <a:pPr>
+              <a:lnSpc>
+                <a:spcPct val="120000"/>
+              </a:lnSpc>
+              <a:spcBef>
+                <a:spcPts val="0"/>
+              </a:spcBef>
+            </a:pPr>
+            <a:r>
+              <a:rPr lang="en-CA" sz="9600" dirty="0" err="1" smtClean="0"/>
+              <a:t>Jayaram</a:t>
+            </a:r>
+            <a:r>
+              <a:rPr lang="en-CA" sz="9600" dirty="0" smtClean="0"/>
+              <a:t> </a:t>
+            </a:r>
+            <a:r>
+              <a:rPr lang="en-CA" sz="9600" dirty="0" err="1"/>
+              <a:t>Shivas</a:t>
+            </a:r>
+            <a:r>
+              <a:rPr lang="en-CA" sz="9600" dirty="0"/>
+              <a:t> </a:t>
+            </a:r>
+            <a:r>
+              <a:rPr lang="en-CA" sz="9600" dirty="0" err="1" smtClean="0"/>
+              <a:t>Vadakumpuram</a:t>
+            </a:r>
+            <a:r>
+              <a:rPr lang="en-CA" sz="9600" dirty="0" smtClean="0"/>
+              <a:t>, </a:t>
+            </a:r>
+            <a:r>
+              <a:rPr lang="en-CA" sz="9600" u="sng" dirty="0" smtClean="0">
+                <a:hlinkClick r:id="rId4"/>
+              </a:rPr>
+              <a:t>shivasj@gmail.com</a:t>
+            </a:r>
+            <a:endParaRPr lang="fr-CA" sz="9600" dirty="0"/>
+          </a:p>
+          <a:p>
+            <a:pPr>
+              <a:lnSpc>
+                <a:spcPct val="120000"/>
+              </a:lnSpc>
+              <a:spcBef>
+                <a:spcPts val="0"/>
+              </a:spcBef>
+            </a:pPr>
+            <a:endParaRPr lang="en-US" dirty="0"/>
           </a:p>
         </p:txBody>
       </p:sp>
@@ -3018,6 +3142,294 @@
     <p:extLst>
       <p:ext uri="{BB962C8B-B14F-4D97-AF65-F5344CB8AC3E}">
         <p14:creationId xmlns:p14="http://schemas.microsoft.com/office/powerpoint/2010/main" val="2014797668"/>
+      </p:ext>
+    </p:extLst>
+  </p:cSld>
+  <p:clrMapOvr>
+    <a:masterClrMapping/>
+  </p:clrMapOvr>
+</p:sld>
+</file>
+
+<file path=ppt/slides/slide2.xml><?xml version="1.0" encoding="utf-8"?>
+<p:sld xmlns:a="http://schemas.openxmlformats.org/drawingml/2006/main" xmlns:r="http://schemas.openxmlformats.org/officeDocument/2006/relationships" xmlns:p="http://schemas.openxmlformats.org/presentationml/2006/main">
+  <p:cSld>
+    <p:spTree>
+      <p:nvGrpSpPr>
+        <p:cNvPr id="1" name=""/>
+        <p:cNvGrpSpPr/>
+        <p:nvPr/>
+      </p:nvGrpSpPr>
+      <p:grpSpPr>
+        <a:xfrm>
+          <a:off x="0" y="0"/>
+          <a:ext cx="0" cy="0"/>
+          <a:chOff x="0" y="0"/>
+          <a:chExt cx="0" cy="0"/>
+        </a:xfrm>
+      </p:grpSpPr>
+      <p:sp>
+        <p:nvSpPr>
+          <p:cNvPr id="2" name="Titre 1"/>
+          <p:cNvSpPr>
+            <a:spLocks noGrp="1"/>
+          </p:cNvSpPr>
+          <p:nvPr>
+            <p:ph type="title"/>
+          </p:nvPr>
+        </p:nvSpPr>
+        <p:spPr/>
+        <p:txBody>
+          <a:bodyPr/>
+          <a:lstStyle/>
+          <a:p>
+            <a:r>
+              <a:rPr lang="fr-CA" dirty="0" smtClean="0"/>
+              <a:t>Goals</a:t>
+            </a:r>
+            <a:endParaRPr lang="fr-CA" dirty="0"/>
+          </a:p>
+        </p:txBody>
+      </p:sp>
+      <p:sp>
+        <p:nvSpPr>
+          <p:cNvPr id="3" name="Espace réservé du contenu 2"/>
+          <p:cNvSpPr>
+            <a:spLocks noGrp="1"/>
+          </p:cNvSpPr>
+          <p:nvPr>
+            <p:ph idx="1"/>
+          </p:nvPr>
+        </p:nvSpPr>
+        <p:spPr/>
+        <p:txBody>
+          <a:bodyPr/>
+          <a:lstStyle/>
+          <a:p>
+            <a:endParaRPr lang="fr-CA"/>
+          </a:p>
+        </p:txBody>
+      </p:sp>
+    </p:spTree>
+    <p:extLst>
+      <p:ext uri="{BB962C8B-B14F-4D97-AF65-F5344CB8AC3E}">
+        <p14:creationId xmlns:p14="http://schemas.microsoft.com/office/powerpoint/2010/main" val="1821572291"/>
+      </p:ext>
+    </p:extLst>
+  </p:cSld>
+  <p:clrMapOvr>
+    <a:masterClrMapping/>
+  </p:clrMapOvr>
+</p:sld>
+</file>
+
+<file path=ppt/slides/slide3.xml><?xml version="1.0" encoding="utf-8"?>
+<p:sld xmlns:a="http://schemas.openxmlformats.org/drawingml/2006/main" xmlns:r="http://schemas.openxmlformats.org/officeDocument/2006/relationships" xmlns:p="http://schemas.openxmlformats.org/presentationml/2006/main">
+  <p:cSld>
+    <p:spTree>
+      <p:nvGrpSpPr>
+        <p:cNvPr id="1" name=""/>
+        <p:cNvGrpSpPr/>
+        <p:nvPr/>
+      </p:nvGrpSpPr>
+      <p:grpSpPr>
+        <a:xfrm>
+          <a:off x="0" y="0"/>
+          <a:ext cx="0" cy="0"/>
+          <a:chOff x="0" y="0"/>
+          <a:chExt cx="0" cy="0"/>
+        </a:xfrm>
+      </p:grpSpPr>
+      <p:sp>
+        <p:nvSpPr>
+          <p:cNvPr id="2" name="Titre 1"/>
+          <p:cNvSpPr>
+            <a:spLocks noGrp="1"/>
+          </p:cNvSpPr>
+          <p:nvPr>
+            <p:ph type="title"/>
+          </p:nvPr>
+        </p:nvSpPr>
+        <p:spPr/>
+        <p:txBody>
+          <a:bodyPr/>
+          <a:lstStyle/>
+          <a:p>
+            <a:r>
+              <a:rPr lang="fr-CA" dirty="0" err="1" smtClean="0"/>
+              <a:t>Tasks</a:t>
+            </a:r>
+            <a:endParaRPr lang="fr-CA" dirty="0"/>
+          </a:p>
+        </p:txBody>
+      </p:sp>
+      <p:sp>
+        <p:nvSpPr>
+          <p:cNvPr id="3" name="Espace réservé du contenu 2"/>
+          <p:cNvSpPr>
+            <a:spLocks noGrp="1"/>
+          </p:cNvSpPr>
+          <p:nvPr>
+            <p:ph idx="1"/>
+          </p:nvPr>
+        </p:nvSpPr>
+        <p:spPr/>
+        <p:txBody>
+          <a:bodyPr/>
+          <a:lstStyle/>
+          <a:p>
+            <a:endParaRPr lang="fr-CA"/>
+          </a:p>
+        </p:txBody>
+      </p:sp>
+    </p:spTree>
+    <p:extLst>
+      <p:ext uri="{BB962C8B-B14F-4D97-AF65-F5344CB8AC3E}">
+        <p14:creationId xmlns:p14="http://schemas.microsoft.com/office/powerpoint/2010/main" val="1231251372"/>
+      </p:ext>
+    </p:extLst>
+  </p:cSld>
+  <p:clrMapOvr>
+    <a:masterClrMapping/>
+  </p:clrMapOvr>
+</p:sld>
+</file>
+
+<file path=ppt/slides/slide4.xml><?xml version="1.0" encoding="utf-8"?>
+<p:sld xmlns:a="http://schemas.openxmlformats.org/drawingml/2006/main" xmlns:r="http://schemas.openxmlformats.org/officeDocument/2006/relationships" xmlns:p="http://schemas.openxmlformats.org/presentationml/2006/main">
+  <p:cSld>
+    <p:spTree>
+      <p:nvGrpSpPr>
+        <p:cNvPr id="1" name=""/>
+        <p:cNvGrpSpPr/>
+        <p:nvPr/>
+      </p:nvGrpSpPr>
+      <p:grpSpPr>
+        <a:xfrm>
+          <a:off x="0" y="0"/>
+          <a:ext cx="0" cy="0"/>
+          <a:chOff x="0" y="0"/>
+          <a:chExt cx="0" cy="0"/>
+        </a:xfrm>
+      </p:grpSpPr>
+      <p:sp>
+        <p:nvSpPr>
+          <p:cNvPr id="2" name="Titre 1"/>
+          <p:cNvSpPr>
+            <a:spLocks noGrp="1"/>
+          </p:cNvSpPr>
+          <p:nvPr>
+            <p:ph type="title"/>
+          </p:nvPr>
+        </p:nvSpPr>
+        <p:spPr/>
+        <p:txBody>
+          <a:bodyPr/>
+          <a:lstStyle/>
+          <a:p>
+            <a:r>
+              <a:rPr lang="fr-CA" dirty="0" smtClean="0"/>
+              <a:t>Sketches</a:t>
+            </a:r>
+            <a:endParaRPr lang="fr-CA" dirty="0"/>
+          </a:p>
+        </p:txBody>
+      </p:sp>
+      <p:sp>
+        <p:nvSpPr>
+          <p:cNvPr id="3" name="Espace réservé du contenu 2"/>
+          <p:cNvSpPr>
+            <a:spLocks noGrp="1"/>
+          </p:cNvSpPr>
+          <p:nvPr>
+            <p:ph idx="1"/>
+          </p:nvPr>
+        </p:nvSpPr>
+        <p:spPr/>
+        <p:txBody>
+          <a:bodyPr/>
+          <a:lstStyle/>
+          <a:p>
+            <a:endParaRPr lang="fr-CA"/>
+          </a:p>
+        </p:txBody>
+      </p:sp>
+    </p:spTree>
+    <p:extLst>
+      <p:ext uri="{BB962C8B-B14F-4D97-AF65-F5344CB8AC3E}">
+        <p14:creationId xmlns:p14="http://schemas.microsoft.com/office/powerpoint/2010/main" val="1415663577"/>
+      </p:ext>
+    </p:extLst>
+  </p:cSld>
+  <p:clrMapOvr>
+    <a:masterClrMapping/>
+  </p:clrMapOvr>
+</p:sld>
+</file>
+
+<file path=ppt/slides/slide5.xml><?xml version="1.0" encoding="utf-8"?>
+<p:sld xmlns:a="http://schemas.openxmlformats.org/drawingml/2006/main" xmlns:r="http://schemas.openxmlformats.org/officeDocument/2006/relationships" xmlns:p="http://schemas.openxmlformats.org/presentationml/2006/main">
+  <p:cSld>
+    <p:spTree>
+      <p:nvGrpSpPr>
+        <p:cNvPr id="1" name=""/>
+        <p:cNvGrpSpPr/>
+        <p:nvPr/>
+      </p:nvGrpSpPr>
+      <p:grpSpPr>
+        <a:xfrm>
+          <a:off x="0" y="0"/>
+          <a:ext cx="0" cy="0"/>
+          <a:chOff x="0" y="0"/>
+          <a:chExt cx="0" cy="0"/>
+        </a:xfrm>
+      </p:grpSpPr>
+      <p:sp>
+        <p:nvSpPr>
+          <p:cNvPr id="2" name="Titre 1"/>
+          <p:cNvSpPr>
+            <a:spLocks noGrp="1"/>
+          </p:cNvSpPr>
+          <p:nvPr>
+            <p:ph type="title"/>
+          </p:nvPr>
+        </p:nvSpPr>
+        <p:spPr/>
+        <p:txBody>
+          <a:bodyPr/>
+          <a:lstStyle/>
+          <a:p>
+            <a:r>
+              <a:rPr lang="fr-CA" dirty="0" smtClean="0"/>
+              <a:t>Data</a:t>
+            </a:r>
+            <a:endParaRPr lang="fr-CA" dirty="0"/>
+          </a:p>
+        </p:txBody>
+      </p:sp>
+      <p:sp>
+        <p:nvSpPr>
+          <p:cNvPr id="3" name="Espace réservé du contenu 2"/>
+          <p:cNvSpPr>
+            <a:spLocks noGrp="1"/>
+          </p:cNvSpPr>
+          <p:nvPr>
+            <p:ph idx="1"/>
+          </p:nvPr>
+        </p:nvSpPr>
+        <p:spPr/>
+        <p:txBody>
+          <a:bodyPr/>
+          <a:lstStyle/>
+          <a:p>
+            <a:endParaRPr lang="fr-CA"/>
+          </a:p>
+        </p:txBody>
+      </p:sp>
+    </p:spTree>
+    <p:extLst>
+      <p:ext uri="{BB962C8B-B14F-4D97-AF65-F5344CB8AC3E}">
+        <p14:creationId xmlns:p14="http://schemas.microsoft.com/office/powerpoint/2010/main" val="788962843"/>
       </p:ext>
     </p:extLst>
   </p:cSld>
@@ -3282,7 +3694,7 @@
   <a:extraClrSchemeLst/>
   <a:extLst>
     <a:ext uri="{05A4C25C-085E-4340-85A3-A5531E510DB2}">
-      <thm15:themeFamily xmlns:thm15="http://schemas.microsoft.com/office/thememl/2012/main" name="Office Theme" id="{62F939B6-93AF-4DB8-9C6B-D6C7DFDC589F}" vid="{4A3C46E8-61CC-4603-A589-7422A47A8E4A}"/>
+      <thm15:themeFamily xmlns:thm15="http://schemas.microsoft.com/office/thememl/2012/main" xmlns="" name="Office Theme" id="{62F939B6-93AF-4DB8-9C6B-D6C7DFDC589F}" vid="{4A3C46E8-61CC-4603-A589-7422A47A8E4A}"/>
     </a:ext>
   </a:extLst>
 </a:theme>

</xml_diff>